<commit_message>
changes made in ppt
</commit_message>
<xml_diff>
--- a/RationBalancing.pptx
+++ b/RationBalancing.pptx
@@ -116,6 +116,11 @@
       </a:defRPr>
     </a:lvl9pPr>
   </p:defaultTextStyle>
+  <p:extLst>
+    <p:ext uri="{EFAFB233-063F-42B5-8137-9DF3F51BA10A}">
+      <p15:sldGuideLst xmlns:p15="http://schemas.microsoft.com/office/powerpoint/2012/main"/>
+    </p:ext>
+  </p:extLst>
 </p:presentation>
 </file>
 
@@ -791,7 +796,7 @@
           <a:p>
             <a:fld id="{6AD6EE87-EBD5-4F12-A48A-63ACA297AC8F}" type="datetimeFigureOut">
               <a:rPr lang="en-US" dirty="0"/>
-              <a:t>7/1/2019</a:t>
+              <a:t>7/2/2019</a:t>
             </a:fld>
             <a:endParaRPr lang="en-US" dirty="0"/>
           </a:p>
@@ -1039,7 +1044,7 @@
           <a:p>
             <a:fld id="{4CD73815-2707-4475-8F1A-B873CB631BB4}" type="datetimeFigureOut">
               <a:rPr lang="en-US" dirty="0"/>
-              <a:t>7/1/2019</a:t>
+              <a:t>7/2/2019</a:t>
             </a:fld>
             <a:endParaRPr lang="en-US" dirty="0"/>
           </a:p>
@@ -1214,7 +1219,7 @@
           <a:p>
             <a:fld id="{2A4AFB99-0EAB-4182-AFF8-E214C82A68F6}" type="datetimeFigureOut">
               <a:rPr lang="en-US" dirty="0"/>
-              <a:t>7/1/2019</a:t>
+              <a:t>7/2/2019</a:t>
             </a:fld>
             <a:endParaRPr lang="en-US" dirty="0"/>
           </a:p>
@@ -1414,7 +1419,7 @@
           <a:p>
             <a:fld id="{A5D3794B-289A-4A80-97D7-111025398D45}" type="datetimeFigureOut">
               <a:rPr lang="en-US" dirty="0"/>
-              <a:t>7/1/2019</a:t>
+              <a:t>7/2/2019</a:t>
             </a:fld>
             <a:endParaRPr lang="en-US" dirty="0"/>
           </a:p>
@@ -1666,7 +1671,7 @@
           <a:p>
             <a:fld id="{5A61015F-7CC6-4D0A-9D87-873EA4C304CC}" type="datetimeFigureOut">
               <a:rPr lang="en-US" dirty="0"/>
-              <a:t>7/1/2019</a:t>
+              <a:t>7/2/2019</a:t>
             </a:fld>
             <a:endParaRPr lang="en-US" dirty="0"/>
           </a:p>
@@ -1981,7 +1986,7 @@
           <a:p>
             <a:fld id="{93C6A301-0538-44EC-B09D-202E1042A48B}" type="datetimeFigureOut">
               <a:rPr lang="en-US" dirty="0"/>
-              <a:t>7/1/2019</a:t>
+              <a:t>7/2/2019</a:t>
             </a:fld>
             <a:endParaRPr lang="en-US" dirty="0"/>
           </a:p>
@@ -2374,7 +2379,7 @@
           <a:p>
             <a:fld id="{D789574A-8875-45EF-8EA2-3CAA0F7ABC4C}" type="datetimeFigureOut">
               <a:rPr lang="en-US" dirty="0"/>
-              <a:t>7/1/2019</a:t>
+              <a:t>7/2/2019</a:t>
             </a:fld>
             <a:endParaRPr lang="en-US" dirty="0"/>
           </a:p>
@@ -2487,7 +2492,7 @@
           <a:p>
             <a:fld id="{67EF4D4C-5367-4C26-9E2B-D8088D7FCA81}" type="datetimeFigureOut">
               <a:rPr lang="en-US" dirty="0"/>
-              <a:t>7/1/2019</a:t>
+              <a:t>7/2/2019</a:t>
             </a:fld>
             <a:endParaRPr lang="en-US" dirty="0"/>
           </a:p>
@@ -2577,7 +2582,7 @@
           <a:p>
             <a:fld id="{56E91E96-98B0-4413-9547-46F3504108EF}" type="datetimeFigureOut">
               <a:rPr lang="en-US" dirty="0"/>
-              <a:t>7/1/2019</a:t>
+              <a:t>7/2/2019</a:t>
             </a:fld>
             <a:endParaRPr lang="en-US" dirty="0"/>
           </a:p>
@@ -2862,7 +2867,7 @@
           <a:p>
             <a:fld id="{05C68B11-C5A8-448C-8CE9-B1A273C79CFC}" type="datetimeFigureOut">
               <a:rPr lang="en-US" dirty="0"/>
-              <a:t>7/1/2019</a:t>
+              <a:t>7/2/2019</a:t>
             </a:fld>
             <a:endParaRPr lang="en-US" dirty="0"/>
           </a:p>
@@ -3137,7 +3142,7 @@
           <a:p>
             <a:fld id="{C7616CA0-919D-4A49-9C8A-62FDFB3A5183}" type="datetimeFigureOut">
               <a:rPr lang="en-US" dirty="0"/>
-              <a:t>7/1/2019</a:t>
+              <a:t>7/2/2019</a:t>
             </a:fld>
             <a:endParaRPr lang="en-US" dirty="0"/>
           </a:p>
@@ -3383,7 +3388,7 @@
             <a:fld id="{90298CD5-6C1E-4009-B41F-6DF62E31D3BE}" type="datetimeFigureOut">
               <a:rPr lang="en-US" dirty="0"/>
               <a:pPr/>
-              <a:t>7/1/2019</a:t>
+              <a:t>7/2/2019</a:t>
             </a:fld>
             <a:endParaRPr lang="en-US" dirty="0"/>
           </a:p>
@@ -4506,15 +4511,21 @@
           </a:xfrm>
         </p:spPr>
         <p:txBody>
-          <a:bodyPr/>
-          <a:lstStyle/>
-          <a:p>
-            <a:r>
-              <a:rPr lang="en-US" dirty="0">
+          <a:bodyPr>
+            <a:normAutofit/>
+          </a:bodyPr>
+          <a:lstStyle/>
+          <a:p>
+            <a:pPr>
+              <a:buFont typeface="Wingdings" panose="05000000000000000000" pitchFamily="2" charset="2"/>
+              <a:buChar char="v"/>
+            </a:pPr>
+            <a:r>
+              <a:rPr lang="en-US" sz="2800" dirty="0">
                 <a:latin typeface="Times New Roman" panose="02020603050405020304" pitchFamily="18" charset="0"/>
                 <a:cs typeface="Times New Roman" panose="02020603050405020304" pitchFamily="18" charset="0"/>
               </a:rPr>
-              <a:t>The scope of the project is to create an web based application which helps the end user calculate the amount of ration needed for cattle by considering the inputs like cattle weight, feed stuffs, and growth rate. It is used in calculating the amount of ingredients needed for a month.</a:t>
+              <a:t> The scope of the project is to create an web based application which helps the end user calculate the amount of ration needed for cattle by considering the inputs like cattle weight, feed stuffs, and growth rate. It is used in calculating the amount of ingredients needed for a month.</a:t>
             </a:r>
           </a:p>
         </p:txBody>
@@ -4595,32 +4606,30 @@
         </p:nvSpPr>
         <p:spPr/>
         <p:txBody>
-          <a:bodyPr/>
+          <a:bodyPr>
+            <a:normAutofit/>
+          </a:bodyPr>
           <a:lstStyle/>
           <a:p>
             <a:pPr>
-              <a:buFont typeface="Arial" panose="020B0604020202020204" pitchFamily="34" charset="0"/>
-              <a:buChar char="•"/>
+              <a:buFont typeface="Wingdings" panose="05000000000000000000" pitchFamily="2" charset="2"/>
+              <a:buChar char="v"/>
             </a:pPr>
             <a:r>
-              <a:rPr lang="en-US" dirty="0"/>
-              <a:t> </a:t>
-            </a:r>
-            <a:r>
-              <a:rPr lang="en-US" dirty="0">
+              <a:rPr lang="en-US" sz="2800" dirty="0">
                 <a:latin typeface="Times New Roman" panose="02020603050405020304" pitchFamily="18" charset="0"/>
                 <a:cs typeface="Times New Roman" panose="02020603050405020304" pitchFamily="18" charset="0"/>
               </a:rPr>
-              <a:t>The main purpose of the application is to calculate the amount of ration needed for cattle by considering the inputs like cattle weight, feed stuffs, and gain. </a:t>
+              <a:t> The main purpose of the application is to calculate the amount of ration needed for cattle by considering the inputs like cattle weight, feed stuffs, and gain. </a:t>
             </a:r>
           </a:p>
           <a:p>
             <a:pPr>
-              <a:buFont typeface="Arial" panose="020B0604020202020204" pitchFamily="34" charset="0"/>
-              <a:buChar char="•"/>
+              <a:buFont typeface="Wingdings" panose="05000000000000000000" pitchFamily="2" charset="2"/>
+              <a:buChar char="v"/>
             </a:pPr>
             <a:r>
-              <a:rPr lang="en-US" dirty="0">
+              <a:rPr lang="en-US" sz="2800" dirty="0">
                 <a:latin typeface="Times New Roman" panose="02020603050405020304" pitchFamily="18" charset="0"/>
                 <a:cs typeface="Times New Roman" panose="02020603050405020304" pitchFamily="18" charset="0"/>
               </a:rPr>
@@ -4629,24 +4638,33 @@
           </a:p>
           <a:p>
             <a:pPr>
-              <a:buFont typeface="Arial" panose="020B0604020202020204" pitchFamily="34" charset="0"/>
-              <a:buChar char="•"/>
+              <a:buFont typeface="Wingdings" panose="05000000000000000000" pitchFamily="2" charset="2"/>
+              <a:buChar char="v"/>
             </a:pPr>
-            <a:endParaRPr lang="en-US" dirty="0"/>
+            <a:endParaRPr lang="en-US" sz="2800" dirty="0">
+              <a:latin typeface="Times New Roman" panose="02020603050405020304" pitchFamily="18" charset="0"/>
+              <a:cs typeface="Times New Roman" panose="02020603050405020304" pitchFamily="18" charset="0"/>
+            </a:endParaRPr>
           </a:p>
           <a:p>
             <a:pPr>
-              <a:buFont typeface="Arial" panose="020B0604020202020204" pitchFamily="34" charset="0"/>
-              <a:buChar char="•"/>
+              <a:buFont typeface="Wingdings" panose="05000000000000000000" pitchFamily="2" charset="2"/>
+              <a:buChar char="v"/>
             </a:pPr>
-            <a:endParaRPr lang="en-US" dirty="0"/>
+            <a:endParaRPr lang="en-US" sz="2800" dirty="0">
+              <a:latin typeface="Times New Roman" panose="02020603050405020304" pitchFamily="18" charset="0"/>
+              <a:cs typeface="Times New Roman" panose="02020603050405020304" pitchFamily="18" charset="0"/>
+            </a:endParaRPr>
           </a:p>
           <a:p>
             <a:pPr>
-              <a:buFont typeface="Arial" panose="020B0604020202020204" pitchFamily="34" charset="0"/>
-              <a:buChar char="•"/>
+              <a:buFont typeface="Wingdings" panose="05000000000000000000" pitchFamily="2" charset="2"/>
+              <a:buChar char="v"/>
             </a:pPr>
-            <a:endParaRPr lang="en-US" dirty="0"/>
+            <a:endParaRPr lang="en-US" sz="2800" dirty="0">
+              <a:latin typeface="Times New Roman" panose="02020603050405020304" pitchFamily="18" charset="0"/>
+              <a:cs typeface="Times New Roman" panose="02020603050405020304" pitchFamily="18" charset="0"/>
+            </a:endParaRPr>
           </a:p>
         </p:txBody>
       </p:sp>
@@ -4809,11 +4827,13 @@
         </p:nvSpPr>
         <p:spPr/>
         <p:txBody>
-          <a:bodyPr/>
-          <a:lstStyle/>
-          <a:p>
-            <a:r>
-              <a:rPr lang="en-US" dirty="0">
+          <a:bodyPr>
+            <a:normAutofit/>
+          </a:bodyPr>
+          <a:lstStyle/>
+          <a:p>
+            <a:r>
+              <a:rPr lang="en-US" sz="2800" dirty="0">
                 <a:latin typeface="Times New Roman" panose="02020603050405020304" pitchFamily="18" charset="0"/>
                 <a:cs typeface="Times New Roman" panose="02020603050405020304" pitchFamily="18" charset="0"/>
               </a:rPr>
@@ -4822,7 +4842,7 @@
           </a:p>
           <a:p>
             <a:r>
-              <a:rPr lang="en-US" dirty="0">
+              <a:rPr lang="en-US" sz="2800" dirty="0">
                 <a:latin typeface="Times New Roman" panose="02020603050405020304" pitchFamily="18" charset="0"/>
                 <a:cs typeface="Times New Roman" panose="02020603050405020304" pitchFamily="18" charset="0"/>
               </a:rPr>
@@ -4831,31 +4851,24 @@
           </a:p>
           <a:p>
             <a:pPr lvl="1">
-              <a:buFont typeface="Courier New" panose="02070309020205020404" pitchFamily="49" charset="0"/>
-              <a:buChar char="o"/>
+              <a:buFont typeface="Wingdings" panose="05000000000000000000" pitchFamily="2" charset="2"/>
+              <a:buChar char="v"/>
             </a:pPr>
             <a:r>
-              <a:rPr lang="en-US" dirty="0">
+              <a:rPr lang="en-US" sz="2800" dirty="0">
                 <a:latin typeface="Times New Roman" panose="02020603050405020304" pitchFamily="18" charset="0"/>
                 <a:cs typeface="Times New Roman" panose="02020603050405020304" pitchFamily="18" charset="0"/>
               </a:rPr>
-              <a:t> </a:t>
-            </a:r>
-            <a:r>
-              <a:rPr lang="en-US" sz="2000" dirty="0">
-                <a:latin typeface="Times New Roman" panose="02020603050405020304" pitchFamily="18" charset="0"/>
-                <a:cs typeface="Times New Roman" panose="02020603050405020304" pitchFamily="18" charset="0"/>
-              </a:rPr>
-              <a:t>Paper- based prototype</a:t>
+              <a:t> Paper- based prototype</a:t>
             </a:r>
           </a:p>
           <a:p>
             <a:pPr lvl="1">
-              <a:buFont typeface="Courier New" panose="02070309020205020404" pitchFamily="49" charset="0"/>
-              <a:buChar char="o"/>
+              <a:buFont typeface="Wingdings" panose="05000000000000000000" pitchFamily="2" charset="2"/>
+              <a:buChar char="v"/>
             </a:pPr>
             <a:r>
-              <a:rPr lang="en-US" sz="2000" dirty="0">
+              <a:rPr lang="en-US" sz="2800" dirty="0">
                 <a:latin typeface="Times New Roman" panose="02020603050405020304" pitchFamily="18" charset="0"/>
                 <a:cs typeface="Times New Roman" panose="02020603050405020304" pitchFamily="18" charset="0"/>
               </a:rPr>
@@ -4866,7 +4879,7 @@
             <a:pPr marL="128016" lvl="1" indent="0">
               <a:buNone/>
             </a:pPr>
-            <a:endParaRPr lang="en-US" sz="2000" dirty="0">
+            <a:endParaRPr lang="en-US" sz="2800" dirty="0">
               <a:latin typeface="Times New Roman" panose="02020603050405020304" pitchFamily="18" charset="0"/>
               <a:cs typeface="Times New Roman" panose="02020603050405020304" pitchFamily="18" charset="0"/>
             </a:endParaRPr>
@@ -4875,7 +4888,7 @@
             <a:pPr marL="128016" lvl="1" indent="0">
               <a:buNone/>
             </a:pPr>
-            <a:endParaRPr lang="en-US" dirty="0">
+            <a:endParaRPr lang="en-US" sz="2800" dirty="0">
               <a:latin typeface="Times New Roman" panose="02020603050405020304" pitchFamily="18" charset="0"/>
               <a:cs typeface="Times New Roman" panose="02020603050405020304" pitchFamily="18" charset="0"/>
             </a:endParaRPr>

</xml_diff>

<commit_message>
added thank you and any questions slides
</commit_message>
<xml_diff>
--- a/RationBalancing.pptx
+++ b/RationBalancing.pptx
@@ -13,8 +13,8 @@
     <p:sldId id="259" r:id="rId4"/>
     <p:sldId id="260" r:id="rId5"/>
     <p:sldId id="258" r:id="rId6"/>
-    <p:sldId id="262" r:id="rId7"/>
-    <p:sldId id="261" r:id="rId8"/>
+    <p:sldId id="261" r:id="rId7"/>
+    <p:sldId id="262" r:id="rId8"/>
     <p:sldId id="263" r:id="rId9"/>
     <p:sldId id="264" r:id="rId10"/>
     <p:sldId id="265" r:id="rId11"/>
@@ -4096,13 +4096,22 @@
           </a:xfrm>
         </p:spPr>
         <p:txBody>
-          <a:bodyPr/>
-          <a:lstStyle/>
-          <a:p>
-            <a:r>
-              <a:rPr lang="en-US" dirty="0"/>
+          <a:bodyPr>
+            <a:normAutofit/>
+          </a:bodyPr>
+          <a:lstStyle/>
+          <a:p>
+            <a:r>
+              <a:rPr lang="en-US" sz="8000" dirty="0"/>
               <a:t>Thank you </a:t>
             </a:r>
+            <a:r>
+              <a:rPr lang="en-US" sz="8000" dirty="0">
+                <a:sym typeface="Wingdings" panose="05000000000000000000" pitchFamily="2" charset="2"/>
+              </a:rPr>
+              <a:t></a:t>
+            </a:r>
+            <a:endParaRPr lang="en-US" sz="8000" dirty="0"/>
           </a:p>
         </p:txBody>
       </p:sp>
@@ -4182,7 +4191,9 @@
         </p:nvSpPr>
         <p:spPr/>
         <p:txBody>
-          <a:bodyPr/>
+          <a:bodyPr>
+            <a:normAutofit/>
+          </a:bodyPr>
           <a:lstStyle/>
           <a:p>
             <a:pPr marL="457200" indent="-457200">
@@ -4190,7 +4201,7 @@
               <a:buAutoNum type="arabicPeriod"/>
             </a:pPr>
             <a:r>
-              <a:rPr lang="en-US" dirty="0"/>
+              <a:rPr lang="en-US" sz="2800" dirty="0"/>
               <a:t>Client introduction</a:t>
             </a:r>
           </a:p>
@@ -4200,7 +4211,7 @@
               <a:buAutoNum type="arabicPeriod"/>
             </a:pPr>
             <a:r>
-              <a:rPr lang="en-US" dirty="0"/>
+              <a:rPr lang="en-US" sz="2800" dirty="0"/>
               <a:t>Purpose and scope of application</a:t>
             </a:r>
           </a:p>
@@ -4210,7 +4221,7 @@
               <a:buAutoNum type="arabicPeriod"/>
             </a:pPr>
             <a:r>
-              <a:rPr lang="en-US" dirty="0"/>
+              <a:rPr lang="en-US" sz="2800" dirty="0"/>
               <a:t>User requirements</a:t>
             </a:r>
           </a:p>
@@ -4220,7 +4231,7 @@
               <a:buAutoNum type="arabicPeriod"/>
             </a:pPr>
             <a:r>
-              <a:rPr lang="en-US" dirty="0"/>
+              <a:rPr lang="en-US" sz="2800" dirty="0"/>
               <a:t>Calculation </a:t>
             </a:r>
           </a:p>
@@ -4230,7 +4241,7 @@
               <a:buAutoNum type="arabicPeriod"/>
             </a:pPr>
             <a:r>
-              <a:rPr lang="en-US" dirty="0"/>
+              <a:rPr lang="en-US" sz="2800" dirty="0"/>
               <a:t>Prototype</a:t>
             </a:r>
           </a:p>
@@ -4240,7 +4251,7 @@
               <a:buAutoNum type="arabicPeriod"/>
             </a:pPr>
             <a:r>
-              <a:rPr lang="en-US" dirty="0"/>
+              <a:rPr lang="en-US" sz="2800" dirty="0"/>
               <a:t>Conclusion </a:t>
             </a:r>
           </a:p>
@@ -4249,7 +4260,7 @@
               <a:buFont typeface="+mj-lt"/>
               <a:buAutoNum type="arabicPeriod"/>
             </a:pPr>
-            <a:endParaRPr lang="en-US" dirty="0"/>
+            <a:endParaRPr lang="en-US" sz="2800" dirty="0"/>
           </a:p>
         </p:txBody>
       </p:sp>
@@ -4478,11 +4489,15 @@
         </p:nvSpPr>
         <p:spPr/>
         <p:txBody>
-          <a:bodyPr/>
-          <a:lstStyle/>
-          <a:p>
-            <a:r>
-              <a:rPr lang="en-US" dirty="0"/>
+          <a:bodyPr>
+            <a:normAutofit/>
+          </a:bodyPr>
+          <a:lstStyle/>
+          <a:p>
+            <a:r>
+              <a:rPr lang="en-US" sz="4800" dirty="0">
+                <a:cs typeface="Times New Roman" panose="02020603050405020304" pitchFamily="18" charset="0"/>
+              </a:rPr>
               <a:t>scope</a:t>
             </a:r>
           </a:p>
@@ -4525,7 +4540,7 @@
                 <a:latin typeface="Times New Roman" panose="02020603050405020304" pitchFamily="18" charset="0"/>
                 <a:cs typeface="Times New Roman" panose="02020603050405020304" pitchFamily="18" charset="0"/>
               </a:rPr>
-              <a:t> The scope of the project is to create an web based application which helps the end user calculate the amount of ration needed for cattle by considering the inputs like cattle weight, feed stuffs, and growth rate. It is used in calculating the amount of ingredients needed for a month.</a:t>
+              <a:t> The scope of the project is to create an web based application which helps the end user calculate the amount of ration needed for cattle by considering the inputs like cattle weight, feed stuffs, and growth rate. It is used in calculating the amount of ingredients needed for a day.</a:t>
             </a:r>
           </a:p>
         </p:txBody>
@@ -4703,7 +4718,7 @@
           <p:cNvPr id="2" name="Title 1">
             <a:extLst>
               <a:ext uri="{FF2B5EF4-FFF2-40B4-BE49-F238E27FC236}">
-                <a16:creationId xmlns:a16="http://schemas.microsoft.com/office/drawing/2014/main" id="{F74B9965-5637-46A8-9946-F2F2FAB95B2A}"/>
+                <a16:creationId xmlns:a16="http://schemas.microsoft.com/office/drawing/2014/main" id="{88DFFB61-2C90-4370-99E2-2CF3A86ED14A}"/>
               </a:ext>
             </a:extLst>
           </p:cNvPr>
@@ -4721,7 +4736,7 @@
           <a:p>
             <a:r>
               <a:rPr lang="en-US" dirty="0"/>
-              <a:t>Calculation</a:t>
+              <a:t>Prototype</a:t>
             </a:r>
           </a:p>
         </p:txBody>
@@ -4731,7 +4746,7 @@
           <p:cNvPr id="3" name="Content Placeholder 2">
             <a:extLst>
               <a:ext uri="{FF2B5EF4-FFF2-40B4-BE49-F238E27FC236}">
-                <a16:creationId xmlns:a16="http://schemas.microsoft.com/office/drawing/2014/main" id="{1E6E0428-039F-4DBE-893C-ABADF5BA5ACC}"/>
+                <a16:creationId xmlns:a16="http://schemas.microsoft.com/office/drawing/2014/main" id="{017C6710-C30D-43A2-8FF7-90B592B2A8E8}"/>
               </a:ext>
             </a:extLst>
           </p:cNvPr>
@@ -4744,17 +4759,78 @@
         </p:nvSpPr>
         <p:spPr/>
         <p:txBody>
-          <a:bodyPr/>
-          <a:lstStyle/>
-          <a:p>
-            <a:endParaRPr lang="en-US" dirty="0"/>
+          <a:bodyPr>
+            <a:normAutofit/>
+          </a:bodyPr>
+          <a:lstStyle/>
+          <a:p>
+            <a:r>
+              <a:rPr lang="en-US" sz="2800" dirty="0">
+                <a:latin typeface="Times New Roman" panose="02020603050405020304" pitchFamily="18" charset="0"/>
+                <a:cs typeface="Times New Roman" panose="02020603050405020304" pitchFamily="18" charset="0"/>
+              </a:rPr>
+              <a:t>A prototype is an early sample, model, or release of a product built to test a concept or process or to act as a thing to be replicated or learned from.</a:t>
+            </a:r>
+          </a:p>
+          <a:p>
+            <a:r>
+              <a:rPr lang="en-US" sz="2800" dirty="0">
+                <a:latin typeface="Times New Roman" panose="02020603050405020304" pitchFamily="18" charset="0"/>
+                <a:cs typeface="Times New Roman" panose="02020603050405020304" pitchFamily="18" charset="0"/>
+              </a:rPr>
+              <a:t>We have developed 2 types of prototypes:</a:t>
+            </a:r>
+          </a:p>
+          <a:p>
+            <a:pPr lvl="1">
+              <a:buFont typeface="Wingdings" panose="05000000000000000000" pitchFamily="2" charset="2"/>
+              <a:buChar char="v"/>
+            </a:pPr>
+            <a:r>
+              <a:rPr lang="en-US" sz="2800" dirty="0">
+                <a:latin typeface="Times New Roman" panose="02020603050405020304" pitchFamily="18" charset="0"/>
+                <a:cs typeface="Times New Roman" panose="02020603050405020304" pitchFamily="18" charset="0"/>
+              </a:rPr>
+              <a:t> Paper- based prototype</a:t>
+            </a:r>
+          </a:p>
+          <a:p>
+            <a:pPr lvl="1">
+              <a:buFont typeface="Wingdings" panose="05000000000000000000" pitchFamily="2" charset="2"/>
+              <a:buChar char="v"/>
+            </a:pPr>
+            <a:r>
+              <a:rPr lang="en-US" sz="2800" dirty="0">
+                <a:latin typeface="Times New Roman" panose="02020603050405020304" pitchFamily="18" charset="0"/>
+                <a:cs typeface="Times New Roman" panose="02020603050405020304" pitchFamily="18" charset="0"/>
+              </a:rPr>
+              <a:t> Mock-up</a:t>
+            </a:r>
+          </a:p>
+          <a:p>
+            <a:pPr marL="128016" lvl="1" indent="0">
+              <a:buNone/>
+            </a:pPr>
+            <a:endParaRPr lang="en-US" sz="2800" dirty="0">
+              <a:latin typeface="Times New Roman" panose="02020603050405020304" pitchFamily="18" charset="0"/>
+              <a:cs typeface="Times New Roman" panose="02020603050405020304" pitchFamily="18" charset="0"/>
+            </a:endParaRPr>
+          </a:p>
+          <a:p>
+            <a:pPr marL="128016" lvl="1" indent="0">
+              <a:buNone/>
+            </a:pPr>
+            <a:endParaRPr lang="en-US" sz="2800" dirty="0">
+              <a:latin typeface="Times New Roman" panose="02020603050405020304" pitchFamily="18" charset="0"/>
+              <a:cs typeface="Times New Roman" panose="02020603050405020304" pitchFamily="18" charset="0"/>
+            </a:endParaRPr>
           </a:p>
         </p:txBody>
       </p:sp>
     </p:spTree>
     <p:extLst>
       <p:ext uri="{BB962C8B-B14F-4D97-AF65-F5344CB8AC3E}">
-        <p14:creationId xmlns:p14="http://schemas.microsoft.com/office/powerpoint/2010/main" val="2258215975"/>
+        <p14:creationId xmlns:p14="http://schemas.microsoft.com/office/powerpoint/2010/main" val="13432788"/>
       </p:ext>
     </p:extLst>
   </p:cSld>
@@ -4786,7 +4862,7 @@
           <p:cNvPr id="2" name="Title 1">
             <a:extLst>
               <a:ext uri="{FF2B5EF4-FFF2-40B4-BE49-F238E27FC236}">
-                <a16:creationId xmlns:a16="http://schemas.microsoft.com/office/drawing/2014/main" id="{88DFFB61-2C90-4370-99E2-2CF3A86ED14A}"/>
+                <a16:creationId xmlns:a16="http://schemas.microsoft.com/office/drawing/2014/main" id="{F74B9965-5637-46A8-9946-F2F2FAB95B2A}"/>
               </a:ext>
             </a:extLst>
           </p:cNvPr>
@@ -4804,7 +4880,7 @@
           <a:p>
             <a:r>
               <a:rPr lang="en-US" dirty="0"/>
-              <a:t>Prototype</a:t>
+              <a:t>Calculation</a:t>
             </a:r>
           </a:p>
         </p:txBody>
@@ -4814,7 +4890,7 @@
           <p:cNvPr id="3" name="Content Placeholder 2">
             <a:extLst>
               <a:ext uri="{FF2B5EF4-FFF2-40B4-BE49-F238E27FC236}">
-                <a16:creationId xmlns:a16="http://schemas.microsoft.com/office/drawing/2014/main" id="{017C6710-C30D-43A2-8FF7-90B592B2A8E8}"/>
+                <a16:creationId xmlns:a16="http://schemas.microsoft.com/office/drawing/2014/main" id="{1E6E0428-039F-4DBE-893C-ABADF5BA5ACC}"/>
               </a:ext>
             </a:extLst>
           </p:cNvPr>
@@ -4827,78 +4903,17 @@
         </p:nvSpPr>
         <p:spPr/>
         <p:txBody>
-          <a:bodyPr>
-            <a:normAutofit/>
-          </a:bodyPr>
-          <a:lstStyle/>
-          <a:p>
-            <a:r>
-              <a:rPr lang="en-US" sz="2800" dirty="0">
-                <a:latin typeface="Times New Roman" panose="02020603050405020304" pitchFamily="18" charset="0"/>
-                <a:cs typeface="Times New Roman" panose="02020603050405020304" pitchFamily="18" charset="0"/>
-              </a:rPr>
-              <a:t>A prototype is an early sample, model, or release of a product built to test a concept or process or to act as a thing to be replicated or learned from.</a:t>
-            </a:r>
-          </a:p>
-          <a:p>
-            <a:r>
-              <a:rPr lang="en-US" sz="2800" dirty="0">
-                <a:latin typeface="Times New Roman" panose="02020603050405020304" pitchFamily="18" charset="0"/>
-                <a:cs typeface="Times New Roman" panose="02020603050405020304" pitchFamily="18" charset="0"/>
-              </a:rPr>
-              <a:t>We have developed 2 types of prototypes:</a:t>
-            </a:r>
-          </a:p>
-          <a:p>
-            <a:pPr lvl="1">
-              <a:buFont typeface="Wingdings" panose="05000000000000000000" pitchFamily="2" charset="2"/>
-              <a:buChar char="v"/>
-            </a:pPr>
-            <a:r>
-              <a:rPr lang="en-US" sz="2800" dirty="0">
-                <a:latin typeface="Times New Roman" panose="02020603050405020304" pitchFamily="18" charset="0"/>
-                <a:cs typeface="Times New Roman" panose="02020603050405020304" pitchFamily="18" charset="0"/>
-              </a:rPr>
-              <a:t> Paper- based prototype</a:t>
-            </a:r>
-          </a:p>
-          <a:p>
-            <a:pPr lvl="1">
-              <a:buFont typeface="Wingdings" panose="05000000000000000000" pitchFamily="2" charset="2"/>
-              <a:buChar char="v"/>
-            </a:pPr>
-            <a:r>
-              <a:rPr lang="en-US" sz="2800" dirty="0">
-                <a:latin typeface="Times New Roman" panose="02020603050405020304" pitchFamily="18" charset="0"/>
-                <a:cs typeface="Times New Roman" panose="02020603050405020304" pitchFamily="18" charset="0"/>
-              </a:rPr>
-              <a:t> Mock-up</a:t>
-            </a:r>
-          </a:p>
-          <a:p>
-            <a:pPr marL="128016" lvl="1" indent="0">
-              <a:buNone/>
-            </a:pPr>
-            <a:endParaRPr lang="en-US" sz="2800" dirty="0">
-              <a:latin typeface="Times New Roman" panose="02020603050405020304" pitchFamily="18" charset="0"/>
-              <a:cs typeface="Times New Roman" panose="02020603050405020304" pitchFamily="18" charset="0"/>
-            </a:endParaRPr>
-          </a:p>
-          <a:p>
-            <a:pPr marL="128016" lvl="1" indent="0">
-              <a:buNone/>
-            </a:pPr>
-            <a:endParaRPr lang="en-US" sz="2800" dirty="0">
-              <a:latin typeface="Times New Roman" panose="02020603050405020304" pitchFamily="18" charset="0"/>
-              <a:cs typeface="Times New Roman" panose="02020603050405020304" pitchFamily="18" charset="0"/>
-            </a:endParaRPr>
+          <a:bodyPr/>
+          <a:lstStyle/>
+          <a:p>
+            <a:endParaRPr lang="en-US" dirty="0"/>
           </a:p>
         </p:txBody>
       </p:sp>
     </p:spTree>
     <p:extLst>
       <p:ext uri="{BB962C8B-B14F-4D97-AF65-F5344CB8AC3E}">
-        <p14:creationId xmlns:p14="http://schemas.microsoft.com/office/powerpoint/2010/main" val="13432788"/>
+        <p14:creationId xmlns:p14="http://schemas.microsoft.com/office/powerpoint/2010/main" val="2258215975"/>
       </p:ext>
     </p:extLst>
   </p:cSld>
@@ -4971,7 +4986,9 @@
         </p:nvSpPr>
         <p:spPr/>
         <p:txBody>
-          <a:bodyPr/>
+          <a:bodyPr>
+            <a:normAutofit/>
+          </a:bodyPr>
           <a:lstStyle/>
           <a:p>
             <a:pPr>
@@ -4979,7 +4996,7 @@
               <a:buChar char="v"/>
             </a:pPr>
             <a:r>
-              <a:rPr lang="en-US" dirty="0">
+              <a:rPr lang="en-US" sz="2800" dirty="0">
                 <a:latin typeface="Times New Roman" panose="02020603050405020304" pitchFamily="18" charset="0"/>
                 <a:cs typeface="Times New Roman" panose="02020603050405020304" pitchFamily="18" charset="0"/>
               </a:rPr>
@@ -4992,7 +5009,7 @@
               <a:buChar char="v"/>
             </a:pPr>
             <a:r>
-              <a:rPr lang="en-US" dirty="0">
+              <a:rPr lang="en-US" sz="2800" dirty="0">
                 <a:latin typeface="Times New Roman" panose="02020603050405020304" pitchFamily="18" charset="0"/>
                 <a:cs typeface="Times New Roman" panose="02020603050405020304" pitchFamily="18" charset="0"/>
               </a:rPr>
@@ -5005,7 +5022,7 @@
               <a:buChar char="v"/>
             </a:pPr>
             <a:r>
-              <a:rPr lang="en-US" dirty="0">
+              <a:rPr lang="en-US" sz="2800" dirty="0">
                 <a:latin typeface="Times New Roman" panose="02020603050405020304" pitchFamily="18" charset="0"/>
                 <a:cs typeface="Times New Roman" panose="02020603050405020304" pitchFamily="18" charset="0"/>
               </a:rPr>
@@ -5013,13 +5030,13 @@
             </a:r>
           </a:p>
           <a:p>
-            <a:endParaRPr lang="en-US" dirty="0"/>
-          </a:p>
-          <a:p>
-            <a:endParaRPr lang="en-US" dirty="0"/>
-          </a:p>
-          <a:p>
-            <a:endParaRPr lang="en-US" dirty="0"/>
+            <a:endParaRPr lang="en-US" sz="2800" dirty="0"/>
+          </a:p>
+          <a:p>
+            <a:endParaRPr lang="en-US" sz="2800" dirty="0"/>
+          </a:p>
+          <a:p>
+            <a:endParaRPr lang="en-US" sz="2800" dirty="0"/>
           </a:p>
         </p:txBody>
       </p:sp>
@@ -5039,6 +5056,14 @@
 <file path=ppt/slides/slide9.xml><?xml version="1.0" encoding="utf-8"?>
 <p:sld xmlns:a="http://schemas.openxmlformats.org/drawingml/2006/main" xmlns:r="http://schemas.openxmlformats.org/officeDocument/2006/relationships" xmlns:p="http://schemas.openxmlformats.org/presentationml/2006/main">
   <p:cSld>
+    <p:bg>
+      <p:bgPr>
+        <a:solidFill>
+          <a:schemeClr val="bg1"/>
+        </a:solidFill>
+        <a:effectLst/>
+      </p:bgPr>
+    </p:bg>
     <p:spTree>
       <p:nvGrpSpPr>
         <p:cNvPr id="1" name=""/>
@@ -5053,6 +5078,249 @@
           <a:chExt cx="0" cy="0"/>
         </a:xfrm>
       </p:grpSpPr>
+      <p:cxnSp>
+        <p:nvCxnSpPr>
+          <p:cNvPr id="32" name="Straight Connector 22">
+            <a:extLst>
+              <a:ext uri="{FF2B5EF4-FFF2-40B4-BE49-F238E27FC236}">
+                <a16:creationId xmlns:a16="http://schemas.microsoft.com/office/drawing/2014/main" id="{B73DEAEA-BFDB-410C-89E7-02514506C826}"/>
+              </a:ext>
+              <a:ext uri="{C183D7F6-B498-43B3-948B-1728B52AA6E4}">
+                <adec:decorative xmlns:adec="http://schemas.microsoft.com/office/drawing/2017/decorative" val="1"/>
+              </a:ext>
+            </a:extLst>
+          </p:cNvPr>
+          <p:cNvCxnSpPr>
+            <a:cxnSpLocks noGrp="1" noRot="1" noChangeAspect="1" noMove="1" noResize="1" noEditPoints="1" noAdjustHandles="1" noChangeArrowheads="1" noChangeShapeType="1"/>
+          </p:cNvCxnSpPr>
+          <p:nvPr>
+            <p:extLst>
+              <p:ext uri="{386F3935-93C4-4BCD-93E2-E3B085C9AB24}">
+                <p16:designElem xmlns:p16="http://schemas.microsoft.com/office/powerpoint/2015/main" val="1"/>
+              </p:ext>
+            </p:extLst>
+          </p:nvPr>
+        </p:nvCxnSpPr>
+        <p:spPr>
+          <a:xfrm flipV="1">
+            <a:off x="8386842" y="5264106"/>
+            <a:ext cx="0" cy="914400"/>
+          </a:xfrm>
+          <a:prstGeom prst="line">
+            <a:avLst/>
+          </a:prstGeom>
+          <a:ln w="19050">
+            <a:solidFill>
+              <a:schemeClr val="accent1"/>
+            </a:solidFill>
+          </a:ln>
+        </p:spPr>
+        <p:style>
+          <a:lnRef idx="1">
+            <a:schemeClr val="accent1"/>
+          </a:lnRef>
+          <a:fillRef idx="0">
+            <a:schemeClr val="accent1"/>
+          </a:fillRef>
+          <a:effectRef idx="0">
+            <a:schemeClr val="accent1"/>
+          </a:effectRef>
+          <a:fontRef idx="minor">
+            <a:schemeClr val="tx1"/>
+          </a:fontRef>
+        </p:style>
+      </p:cxnSp>
+      <p:sp>
+        <p:nvSpPr>
+          <p:cNvPr id="33" name="Rectangle 24">
+            <a:extLst>
+              <a:ext uri="{FF2B5EF4-FFF2-40B4-BE49-F238E27FC236}">
+                <a16:creationId xmlns:a16="http://schemas.microsoft.com/office/drawing/2014/main" id="{6EAAB671-E1B2-4834-B3F6-E0A2D3BE861F}"/>
+              </a:ext>
+              <a:ext uri="{C183D7F6-B498-43B3-948B-1728B52AA6E4}">
+                <adec:decorative xmlns:adec="http://schemas.microsoft.com/office/drawing/2017/decorative" val="1"/>
+              </a:ext>
+            </a:extLst>
+          </p:cNvPr>
+          <p:cNvSpPr>
+            <a:spLocks noGrp="1" noRot="1" noChangeAspect="1" noMove="1" noResize="1" noEditPoints="1" noAdjustHandles="1" noChangeArrowheads="1" noChangeShapeType="1" noTextEdit="1"/>
+          </p:cNvSpPr>
+          <p:nvPr>
+            <p:extLst>
+              <p:ext uri="{386F3935-93C4-4BCD-93E2-E3B085C9AB24}">
+                <p16:designElem xmlns:p16="http://schemas.microsoft.com/office/powerpoint/2015/main" val="1"/>
+              </p:ext>
+            </p:extLst>
+          </p:nvPr>
+        </p:nvSpPr>
+        <p:spPr>
+          <a:xfrm>
+            <a:off x="0" y="0"/>
+            <a:ext cx="12192000" cy="4572001"/>
+          </a:xfrm>
+          <a:prstGeom prst="rect">
+            <a:avLst/>
+          </a:prstGeom>
+          <a:blipFill dpi="0" rotWithShape="1">
+            <a:blip r:embed="rId2">
+              <a:duotone>
+                <a:schemeClr val="accent1">
+                  <a:shade val="45000"/>
+                  <a:satMod val="135000"/>
+                </a:schemeClr>
+                <a:prstClr val="white"/>
+              </a:duotone>
+            </a:blip>
+            <a:srcRect/>
+            <a:tile tx="-133350" ty="-6350" sx="50000" sy="50000" flip="none" algn="tl"/>
+          </a:blipFill>
+          <a:ln>
+            <a:noFill/>
+          </a:ln>
+        </p:spPr>
+        <p:style>
+          <a:lnRef idx="2">
+            <a:schemeClr val="accent1">
+              <a:shade val="50000"/>
+            </a:schemeClr>
+          </a:lnRef>
+          <a:fillRef idx="1">
+            <a:schemeClr val="accent1"/>
+          </a:fillRef>
+          <a:effectRef idx="0">
+            <a:schemeClr val="accent1"/>
+          </a:effectRef>
+          <a:fontRef idx="minor">
+            <a:schemeClr val="lt1"/>
+          </a:fontRef>
+        </p:style>
+      </p:sp>
+      <p:sp>
+        <p:nvSpPr>
+          <p:cNvPr id="34" name="Rectangle 26">
+            <a:extLst>
+              <a:ext uri="{FF2B5EF4-FFF2-40B4-BE49-F238E27FC236}">
+                <a16:creationId xmlns:a16="http://schemas.microsoft.com/office/drawing/2014/main" id="{41DE443D-9A89-4F4F-B174-24C80A1E6968}"/>
+              </a:ext>
+              <a:ext uri="{C183D7F6-B498-43B3-948B-1728B52AA6E4}">
+                <adec:decorative xmlns:adec="http://schemas.microsoft.com/office/drawing/2017/decorative" val="1"/>
+              </a:ext>
+            </a:extLst>
+          </p:cNvPr>
+          <p:cNvSpPr>
+            <a:spLocks noGrp="1" noRot="1" noChangeAspect="1" noMove="1" noResize="1" noEditPoints="1" noAdjustHandles="1" noChangeArrowheads="1" noChangeShapeType="1" noTextEdit="1"/>
+          </p:cNvSpPr>
+          <p:nvPr>
+            <p:extLst>
+              <p:ext uri="{386F3935-93C4-4BCD-93E2-E3B085C9AB24}">
+                <p16:designElem xmlns:p16="http://schemas.microsoft.com/office/powerpoint/2015/main" val="1"/>
+              </p:ext>
+            </p:extLst>
+          </p:nvPr>
+        </p:nvSpPr>
+        <p:spPr>
+          <a:xfrm>
+            <a:off x="0" y="0"/>
+            <a:ext cx="12188952" cy="4572000"/>
+          </a:xfrm>
+          <a:prstGeom prst="rect">
+            <a:avLst/>
+          </a:prstGeom>
+          <a:solidFill>
+            <a:schemeClr val="bg1"/>
+          </a:solidFill>
+          <a:ln>
+            <a:noFill/>
+          </a:ln>
+        </p:spPr>
+        <p:style>
+          <a:lnRef idx="2">
+            <a:schemeClr val="accent1">
+              <a:shade val="50000"/>
+            </a:schemeClr>
+          </a:lnRef>
+          <a:fillRef idx="1">
+            <a:schemeClr val="accent1"/>
+          </a:fillRef>
+          <a:effectRef idx="0">
+            <a:schemeClr val="accent1"/>
+          </a:effectRef>
+          <a:fontRef idx="minor">
+            <a:schemeClr val="lt1"/>
+          </a:fontRef>
+        </p:style>
+        <p:txBody>
+          <a:bodyPr rtlCol="0" anchor="ctr"/>
+          <a:lstStyle/>
+          <a:p>
+            <a:pPr algn="ctr"/>
+            <a:endParaRPr lang="en-US"/>
+          </a:p>
+        </p:txBody>
+      </p:sp>
+      <p:sp>
+        <p:nvSpPr>
+          <p:cNvPr id="35" name="Rectangle 28">
+            <a:extLst>
+              <a:ext uri="{FF2B5EF4-FFF2-40B4-BE49-F238E27FC236}">
+                <a16:creationId xmlns:a16="http://schemas.microsoft.com/office/drawing/2014/main" id="{B34E3164-F487-4F42-9E73-153A80BE3F40}"/>
+              </a:ext>
+              <a:ext uri="{C183D7F6-B498-43B3-948B-1728B52AA6E4}">
+                <adec:decorative xmlns:adec="http://schemas.microsoft.com/office/drawing/2017/decorative" val="1"/>
+              </a:ext>
+            </a:extLst>
+          </p:cNvPr>
+          <p:cNvSpPr>
+            <a:spLocks noGrp="1" noRot="1" noChangeAspect="1" noMove="1" noResize="1" noEditPoints="1" noAdjustHandles="1" noChangeArrowheads="1" noChangeShapeType="1" noTextEdit="1"/>
+          </p:cNvSpPr>
+          <p:nvPr>
+            <p:extLst>
+              <p:ext uri="{386F3935-93C4-4BCD-93E2-E3B085C9AB24}">
+                <p16:designElem xmlns:p16="http://schemas.microsoft.com/office/powerpoint/2015/main" val="1"/>
+              </p:ext>
+            </p:extLst>
+          </p:nvPr>
+        </p:nvSpPr>
+        <p:spPr>
+          <a:xfrm>
+            <a:off x="0" y="4571998"/>
+            <a:ext cx="12188952" cy="2285543"/>
+          </a:xfrm>
+          <a:prstGeom prst="rect">
+            <a:avLst/>
+          </a:prstGeom>
+          <a:solidFill>
+            <a:schemeClr val="accent1"/>
+          </a:solidFill>
+          <a:ln>
+            <a:noFill/>
+          </a:ln>
+        </p:spPr>
+        <p:style>
+          <a:lnRef idx="2">
+            <a:schemeClr val="accent1">
+              <a:shade val="50000"/>
+            </a:schemeClr>
+          </a:lnRef>
+          <a:fillRef idx="1">
+            <a:schemeClr val="accent1"/>
+          </a:fillRef>
+          <a:effectRef idx="0">
+            <a:schemeClr val="accent1"/>
+          </a:effectRef>
+          <a:fontRef idx="minor">
+            <a:schemeClr val="lt1"/>
+          </a:fontRef>
+        </p:style>
+        <p:txBody>
+          <a:bodyPr rtlCol="0" anchor="ctr"/>
+          <a:lstStyle/>
+          <a:p>
+            <a:pPr algn="ctr"/>
+            <a:endParaRPr lang="en-US"/>
+          </a:p>
+        </p:txBody>
+      </p:sp>
       <p:sp>
         <p:nvSpPr>
           <p:cNvPr id="2" name="Title 1">
@@ -5069,43 +5337,114 @@
             <p:ph type="title"/>
           </p:nvPr>
         </p:nvSpPr>
-        <p:spPr/>
-        <p:txBody>
-          <a:bodyPr/>
-          <a:lstStyle/>
-          <a:p>
-            <a:r>
-              <a:rPr lang="en-US" dirty="0"/>
+        <p:spPr>
+          <a:xfrm>
+            <a:off x="457200" y="4960137"/>
+            <a:ext cx="7772400" cy="1463040"/>
+          </a:xfrm>
+        </p:spPr>
+        <p:txBody>
+          <a:bodyPr vert="horz" lIns="91440" tIns="45720" rIns="91440" bIns="45720" rtlCol="0" anchor="ctr">
+            <a:normAutofit/>
+          </a:bodyPr>
+          <a:lstStyle/>
+          <a:p>
+            <a:pPr algn="r"/>
+            <a:r>
+              <a:rPr lang="en-US" spc="200">
+                <a:solidFill>
+                  <a:srgbClr val="FFFFFF"/>
+                </a:solidFill>
+              </a:rPr>
               <a:t>Any questions ? </a:t>
             </a:r>
           </a:p>
         </p:txBody>
       </p:sp>
-      <p:sp>
-        <p:nvSpPr>
-          <p:cNvPr id="3" name="Content Placeholder 2">
+      <p:pic>
+        <p:nvPicPr>
+          <p:cNvPr id="8" name="Content Placeholder 4">
             <a:extLst>
               <a:ext uri="{FF2B5EF4-FFF2-40B4-BE49-F238E27FC236}">
-                <a16:creationId xmlns:a16="http://schemas.microsoft.com/office/drawing/2014/main" id="{0622BCA3-94BB-4B11-B30E-59CE3E2ACCED}"/>
+                <a16:creationId xmlns:a16="http://schemas.microsoft.com/office/drawing/2014/main" id="{02B5F52F-7089-4B52-94BE-73BE7E72DF1A}"/>
               </a:ext>
             </a:extLst>
           </p:cNvPr>
-          <p:cNvSpPr>
-            <a:spLocks noGrp="1"/>
-          </p:cNvSpPr>
-          <p:nvPr>
-            <p:ph idx="1"/>
-          </p:nvPr>
-        </p:nvSpPr>
-        <p:spPr/>
-        <p:txBody>
-          <a:bodyPr/>
-          <a:lstStyle/>
-          <a:p>
-            <a:endParaRPr lang="en-US" dirty="0"/>
-          </a:p>
-        </p:txBody>
-      </p:sp>
+          <p:cNvPicPr>
+            <a:picLocks noChangeAspect="1"/>
+          </p:cNvPicPr>
+          <p:nvPr/>
+        </p:nvPicPr>
+        <p:blipFill rotWithShape="1">
+          <a:blip r:embed="rId3"/>
+          <a:srcRect l="2622" r="-5" b="-5"/>
+          <a:stretch/>
+        </p:blipFill>
+        <p:spPr>
+          <a:xfrm>
+            <a:off x="1428753" y="42085"/>
+            <a:ext cx="9067793" cy="4572000"/>
+          </a:xfrm>
+          <a:prstGeom prst="rect">
+            <a:avLst/>
+          </a:prstGeom>
+        </p:spPr>
+      </p:pic>
+      <p:cxnSp>
+        <p:nvCxnSpPr>
+          <p:cNvPr id="31" name="Straight Connector 30">
+            <a:extLst>
+              <a:ext uri="{FF2B5EF4-FFF2-40B4-BE49-F238E27FC236}">
+                <a16:creationId xmlns:a16="http://schemas.microsoft.com/office/drawing/2014/main" id="{A3301547-2A66-4702-AF5D-6FD5ED317F2E}"/>
+              </a:ext>
+              <a:ext uri="{C183D7F6-B498-43B3-948B-1728B52AA6E4}">
+                <adec:decorative xmlns:adec="http://schemas.microsoft.com/office/drawing/2017/decorative" val="1"/>
+              </a:ext>
+            </a:extLst>
+          </p:cNvPr>
+          <p:cNvCxnSpPr>
+            <a:cxnSpLocks noGrp="1" noRot="1" noChangeAspect="1" noMove="1" noResize="1" noEditPoints="1" noAdjustHandles="1" noChangeArrowheads="1" noChangeShapeType="1"/>
+          </p:cNvCxnSpPr>
+          <p:nvPr>
+            <p:extLst>
+              <p:ext uri="{386F3935-93C4-4BCD-93E2-E3B085C9AB24}">
+                <p16:designElem xmlns:p16="http://schemas.microsoft.com/office/powerpoint/2015/main" val="1"/>
+              </p:ext>
+            </p:extLst>
+          </p:nvPr>
+        </p:nvCxnSpPr>
+        <p:spPr>
+          <a:xfrm flipV="1">
+            <a:off x="8406507" y="5220212"/>
+            <a:ext cx="0" cy="914400"/>
+          </a:xfrm>
+          <a:prstGeom prst="line">
+            <a:avLst/>
+          </a:prstGeom>
+          <a:ln w="19050">
+            <a:solidFill>
+              <a:schemeClr val="accent1">
+                <a:lumMod val="20000"/>
+                <a:lumOff val="80000"/>
+              </a:schemeClr>
+            </a:solidFill>
+          </a:ln>
+        </p:spPr>
+        <p:style>
+          <a:lnRef idx="1">
+            <a:schemeClr val="accent1"/>
+          </a:lnRef>
+          <a:fillRef idx="0">
+            <a:schemeClr val="accent1"/>
+          </a:fillRef>
+          <a:effectRef idx="0">
+            <a:schemeClr val="accent1"/>
+          </a:effectRef>
+          <a:fontRef idx="minor">
+            <a:schemeClr val="tx1"/>
+          </a:fontRef>
+        </p:style>
+      </p:cxnSp>
     </p:spTree>
     <p:extLst>
       <p:ext uri="{BB962C8B-B14F-4D97-AF65-F5344CB8AC3E}">

</xml_diff>